<commit_message>
Katselmointiin uusin digitaalinen LTSPICE kuva
</commit_message>
<xml_diff>
--- a/katselmointi1.pptx
+++ b/katselmointi1.pptx
@@ -233,7 +233,7 @@
             <a:pPr rtl="0"/>
             <a:fld id="{CD0FECFA-2BF2-4F2F-B95B-CBAD11B45EDF}" type="datetime1">
               <a:rPr lang="fi-FI" smtClean="0"/>
-              <a:t>5.3.2025</a:t>
+              <a:t>6.3.2025</a:t>
             </a:fld>
             <a:endParaRPr lang="fi-FI"/>
           </a:p>
@@ -415,7 +415,7 @@
             <a:pPr rtl="0"/>
             <a:fld id="{B84FFCA4-1FF1-4830-AF8C-941660028FE8}" type="datetime1">
               <a:rPr lang="fi-FI" noProof="0" smtClean="0"/>
-              <a:t>5.3.2025</a:t>
+              <a:t>6.3.2025</a:t>
             </a:fld>
             <a:endParaRPr lang="fi-FI" noProof="0"/>
           </a:p>
@@ -923,7 +923,7 @@
           <a:p>
             <a:fld id="{D1D1EADE-8E88-4C7C-8AC5-FB148DE4940E}" type="datetime1">
               <a:rPr lang="en-US" smtClean="0"/>
-              <a:t>3/5/2025</a:t>
+              <a:t>3/6/25</a:t>
             </a:fld>
             <a:endParaRPr lang="en-US"/>
           </a:p>
@@ -1122,7 +1122,7 @@
           <a:p>
             <a:fld id="{EC3C8B9C-477D-492A-96AD-1FC2CC997A73}" type="datetime1">
               <a:rPr lang="en-US" smtClean="0"/>
-              <a:t>3/5/2025</a:t>
+              <a:t>3/6/25</a:t>
             </a:fld>
             <a:endParaRPr lang="en-US"/>
           </a:p>
@@ -1331,7 +1331,7 @@
           <a:p>
             <a:fld id="{42D3AED5-E26D-4E29-B1B3-7847B6779594}" type="datetime1">
               <a:rPr lang="en-US" smtClean="0"/>
-              <a:t>3/5/2025</a:t>
+              <a:t>3/6/25</a:t>
             </a:fld>
             <a:endParaRPr lang="en-US"/>
           </a:p>
@@ -1530,7 +1530,7 @@
           <a:p>
             <a:fld id="{157B6794-849E-4626-908B-D15793550EFB}" type="datetime1">
               <a:rPr lang="en-US" smtClean="0"/>
-              <a:t>3/5/2025</a:t>
+              <a:t>3/6/25</a:t>
             </a:fld>
             <a:endParaRPr lang="en-US"/>
           </a:p>
@@ -1806,7 +1806,7 @@
           <a:p>
             <a:fld id="{63DB64E7-5594-42A3-ADBF-E95A7ACEAD64}" type="datetime1">
               <a:rPr lang="en-US" smtClean="0"/>
-              <a:t>3/5/2025</a:t>
+              <a:t>3/6/25</a:t>
             </a:fld>
             <a:endParaRPr lang="en-US"/>
           </a:p>
@@ -2077,7 +2077,7 @@
           <a:p>
             <a:fld id="{18462B0B-D248-4FFB-8695-AD7FA4B1284A}" type="datetime1">
               <a:rPr lang="en-US" smtClean="0"/>
-              <a:t>3/5/2025</a:t>
+              <a:t>3/6/25</a:t>
             </a:fld>
             <a:endParaRPr lang="en-US"/>
           </a:p>
@@ -2498,7 +2498,7 @@
           <a:p>
             <a:fld id="{D0378EFB-9159-4510-B73F-4F0409ADE937}" type="datetime1">
               <a:rPr lang="en-US" smtClean="0"/>
-              <a:t>3/5/2025</a:t>
+              <a:t>3/6/25</a:t>
             </a:fld>
             <a:endParaRPr lang="en-US"/>
           </a:p>
@@ -2640,7 +2640,7 @@
           <a:p>
             <a:fld id="{89BC9412-2452-4BED-A324-9D8C115361AD}" type="datetime1">
               <a:rPr lang="en-US" smtClean="0"/>
-              <a:t>3/5/2025</a:t>
+              <a:t>3/6/25</a:t>
             </a:fld>
             <a:endParaRPr lang="en-US"/>
           </a:p>
@@ -2754,7 +2754,7 @@
           <a:p>
             <a:fld id="{F5318F62-D251-40E8-A23C-F4CFE9FEAB41}" type="datetime1">
               <a:rPr lang="en-US" smtClean="0"/>
-              <a:t>3/5/2025</a:t>
+              <a:t>3/6/25</a:t>
             </a:fld>
             <a:endParaRPr lang="en-US"/>
           </a:p>
@@ -3066,7 +3066,7 @@
           <a:p>
             <a:fld id="{44F76144-149E-4874-93A5-554A0357CF82}" type="datetime1">
               <a:rPr lang="en-US" smtClean="0"/>
-              <a:t>3/5/2025</a:t>
+              <a:t>3/6/25</a:t>
             </a:fld>
             <a:endParaRPr lang="en-US"/>
           </a:p>
@@ -3358,7 +3358,7 @@
           <a:p>
             <a:fld id="{50BA65D8-0540-4835-AE5C-25D29DBA01BE}" type="datetime1">
               <a:rPr lang="en-US" smtClean="0"/>
-              <a:t>3/5/2025</a:t>
+              <a:t>3/6/25</a:t>
             </a:fld>
             <a:endParaRPr lang="en-US"/>
           </a:p>
@@ -3599,7 +3599,7 @@
           <a:p>
             <a:fld id="{E31BA835-12AC-4E8F-955A-EA3F4DE2791F}" type="datetime1">
               <a:rPr lang="en-US" smtClean="0"/>
-              <a:t>3/5/2025</a:t>
+              <a:t>3/6/25</a:t>
             </a:fld>
             <a:endParaRPr lang="en-US"/>
           </a:p>
@@ -4510,64 +4510,64 @@
           <a:lstStyle/>
           <a:p>
             <a:r>
-              <a:rPr lang="fi-FI" sz="1800" b="1"/>
+              <a:rPr lang="fi-FI" sz="1800" b="1" dirty="0"/>
               <a:t>Analoginen</a:t>
             </a:r>
             <a:r>
-              <a:rPr lang="fi-FI" sz="1800"/>
-              <a:t> -120k vastus (virran rajoitus), muodostaa </a:t>
-            </a:r>
-            <a:r>
-              <a:rPr lang="fi-FI" sz="1800" err="1"/>
-              <a:t>kondensattorin</a:t>
-            </a:r>
-            <a:r>
-              <a:rPr lang="fi-FI" sz="1800"/>
-              <a:t> kanssa alipäästö suodattimen (häiriö signaali)  -&gt; operaatiovahvistin (ei invertoiva 3x vahvistus) , 2.7k vastus (rajoittamaan virtaa) </a:t>
-            </a:r>
-          </a:p>
-          <a:p>
-            <a:r>
-              <a:rPr lang="fi-FI" sz="1800" b="1"/>
+              <a:rPr lang="fi-FI" sz="1800" dirty="0"/>
+              <a:t> -120k vastus (virran rajoitus), muodostaa kondensaattorin kanssa alipäästö suodattimen (häiriö signaali)  -&gt; operaatiovahvistin (ei invertoiva 3x vahvistus) , 2.7k vastus (rajoittamaan virtaa) </a:t>
+            </a:r>
+          </a:p>
+          <a:p>
+            <a:r>
+              <a:rPr lang="fi-FI" sz="1800" b="1" dirty="0"/>
               <a:t>Digitaalinen</a:t>
             </a:r>
             <a:r>
-              <a:rPr lang="fi-FI" sz="1800"/>
+              <a:rPr lang="fi-FI" sz="1800" dirty="0"/>
               <a:t> (</a:t>
             </a:r>
             <a:r>
-              <a:rPr lang="fi-FI" sz="1800" b="1"/>
+              <a:rPr lang="fi-FI" sz="1800" b="1" dirty="0"/>
               <a:t>alustava simulaatio</a:t>
             </a:r>
             <a:r>
-              <a:rPr lang="fi-FI" sz="1800"/>
-              <a:t>) -   120k vastus (virran rajoitus) -&gt; puskurivahvistin (jotta virran rajoitusvastus ei häiritse suodatinta) -&gt; alipäästösuodatin  (lyhentää sisääntulevaa pulssia) -&gt; hystereesi komparaattori, jotta tilat 0 sekä 1 tila voidaan päättää -&gt; 2.7k vastus (rajoittamaan virtaa) . </a:t>
-            </a:r>
-            <a:endParaRPr lang="en-US" sz="1800">
+              <a:rPr lang="fi-FI" sz="1800" dirty="0"/>
+              <a:t>) -   120k vastus (virran rajoitus) -&gt; puskurivahvistin (jotta virran rajoitusvastus ei häiritse suodatinta) -&gt; ylipäästösuodatin  (lyhentää </a:t>
+            </a:r>
+            <a:r>
+              <a:rPr lang="fi-FI" sz="1800" dirty="0" err="1"/>
+              <a:t>sisääntulevaa</a:t>
+            </a:r>
+            <a:r>
+              <a:rPr lang="fi-FI" sz="1800" dirty="0"/>
+              <a:t> pulssia) -&gt; hystereesi komparaattori, jotta tilat 0 sekä 1 tila voidaan päättää -&gt; 2.7k vastus (rajoittamaan virtaa) . </a:t>
+            </a:r>
+            <a:endParaRPr lang="en-US" sz="1800" dirty="0">
               <a:latin typeface="Calisto MT"/>
               <a:cs typeface="Arial"/>
             </a:endParaRPr>
           </a:p>
           <a:p>
             <a:r>
-              <a:rPr lang="fi-FI"/>
+              <a:rPr lang="fi-FI" dirty="0"/>
               <a:t> </a:t>
             </a:r>
             <a:r>
-              <a:rPr lang="fi-FI" sz="1800"/>
+              <a:rPr lang="fi-FI" sz="1800" dirty="0"/>
               <a:t>Tällä hetkellä seuraava rautapuolen vaihe on suunnitella hystereesikomparaattori speksien mukaiseksi. (</a:t>
             </a:r>
             <a:r>
-              <a:rPr lang="en-US" sz="1800"/>
+              <a:rPr lang="en-US" sz="1800" dirty="0"/>
               <a:t>”0” must be &lt; 0.5V , ”1” must be &gt; 4.0V)</a:t>
             </a:r>
-            <a:endParaRPr lang="fi-FI" sz="1800"/>
-          </a:p>
-          <a:p>
-            <a:endParaRPr lang="fi-FI"/>
-          </a:p>
-          <a:p>
-            <a:endParaRPr lang="fi-FI"/>
+            <a:endParaRPr lang="fi-FI" sz="1800" dirty="0"/>
+          </a:p>
+          <a:p>
+            <a:endParaRPr lang="fi-FI" dirty="0"/>
+          </a:p>
+          <a:p>
+            <a:endParaRPr lang="fi-FI" dirty="0"/>
           </a:p>
         </p:txBody>
       </p:sp>
@@ -4594,7 +4594,7 @@
           <a:p>
             <a:fld id="{87E7843D-FF13-4365-9478-9625B70A2705}" type="slidenum">
               <a:rPr lang="en-US" smtClean="0"/>
-              <a:t>3</a:t>
+              <a:t>2</a:t>
             </a:fld>
             <a:endParaRPr lang="en-US"/>
           </a:p>
@@ -4707,7 +4707,7 @@
           <a:p>
             <a:fld id="{87E7843D-FF13-4365-9478-9625B70A2705}" type="slidenum">
               <a:rPr lang="en-US" smtClean="0"/>
-              <a:t>5</a:t>
+              <a:t>3</a:t>
             </a:fld>
             <a:endParaRPr lang="en-US"/>
           </a:p>
@@ -4768,64 +4768,107 @@
           </a:p>
         </p:txBody>
       </p:sp>
+      <p:sp>
+        <p:nvSpPr>
+          <p:cNvPr id="4" name="Dian numeron paikkamerkki 3">
+            <a:extLst>
+              <a:ext uri="{FF2B5EF4-FFF2-40B4-BE49-F238E27FC236}">
+                <a16:creationId xmlns:a16="http://schemas.microsoft.com/office/drawing/2014/main" id="{0E62D80D-56EF-6199-C7B2-9EBA5BBF557C}"/>
+              </a:ext>
+            </a:extLst>
+          </p:cNvPr>
+          <p:cNvSpPr>
+            <a:spLocks noGrp="1"/>
+          </p:cNvSpPr>
+          <p:nvPr>
+            <p:ph type="sldNum" sz="quarter" idx="12"/>
+          </p:nvPr>
+        </p:nvSpPr>
+        <p:spPr/>
+        <p:txBody>
+          <a:bodyPr/>
+          <a:lstStyle/>
+          <a:p>
+            <a:fld id="{87E7843D-FF13-4365-9478-9625B70A2705}" type="slidenum">
+              <a:rPr lang="en-US" smtClean="0"/>
+              <a:t>4</a:t>
+            </a:fld>
+            <a:endParaRPr lang="en-US"/>
+          </a:p>
+        </p:txBody>
+      </p:sp>
+      <p:sp>
+        <p:nvSpPr>
+          <p:cNvPr id="6" name="Content Placeholder 5">
+            <a:extLst>
+              <a:ext uri="{FF2B5EF4-FFF2-40B4-BE49-F238E27FC236}">
+                <a16:creationId xmlns:a16="http://schemas.microsoft.com/office/drawing/2014/main" id="{B9E1FBBB-8C63-1392-76AE-EC7E7C2FB860}"/>
+              </a:ext>
+            </a:extLst>
+          </p:cNvPr>
+          <p:cNvSpPr>
+            <a:spLocks noGrp="1"/>
+          </p:cNvSpPr>
+          <p:nvPr>
+            <p:ph idx="1"/>
+          </p:nvPr>
+        </p:nvSpPr>
+        <p:spPr/>
+        <p:txBody>
+          <a:bodyPr/>
+          <a:lstStyle/>
+          <a:p>
+            <a:endParaRPr lang="en-FI"/>
+          </a:p>
+        </p:txBody>
+      </p:sp>
       <p:pic>
         <p:nvPicPr>
-          <p:cNvPr id="5" name="Sisällön paikkamerkki 4" descr="Kuva, joka sisältää kohteen teksti, kuvakaappaus, ohjelmisto, näyttö&#10;&#10;Tekoälyn luoma sisältö voi olla virheellistä.">
-            <a:extLst>
-              <a:ext uri="{FF2B5EF4-FFF2-40B4-BE49-F238E27FC236}">
-                <a16:creationId xmlns:a16="http://schemas.microsoft.com/office/drawing/2014/main" id="{C5A7056A-E24B-2031-EC7B-94CF0344D2CA}"/>
+          <p:cNvPr id="1028" name="Picture 4" descr="Image">
+            <a:extLst>
+              <a:ext uri="{FF2B5EF4-FFF2-40B4-BE49-F238E27FC236}">
+                <a16:creationId xmlns:a16="http://schemas.microsoft.com/office/drawing/2014/main" id="{980ADEC3-52CD-15D0-1E60-4984B781C3B9}"/>
               </a:ext>
             </a:extLst>
           </p:cNvPr>
           <p:cNvPicPr>
-            <a:picLocks noGrp="1" noChangeAspect="1"/>
+            <a:picLocks noChangeAspect="1" noChangeArrowheads="1"/>
           </p:cNvPicPr>
-          <p:nvPr>
-            <p:ph idx="1"/>
-          </p:nvPr>
+          <p:nvPr/>
         </p:nvPicPr>
         <p:blipFill>
-          <a:blip r:embed="rId2"/>
+          <a:blip r:embed="rId2">
+            <a:extLst>
+              <a:ext uri="{28A0092B-C50C-407E-A947-70E740481C1C}">
+                <a14:useLocalDpi xmlns:a14="http://schemas.microsoft.com/office/drawing/2010/main" val="0"/>
+              </a:ext>
+            </a:extLst>
+          </a:blip>
+          <a:srcRect/>
           <a:stretch>
             <a:fillRect/>
           </a:stretch>
         </p:blipFill>
-        <p:spPr>
+        <p:spPr bwMode="auto">
           <a:xfrm>
-            <a:off x="-4333" y="-2003"/>
-            <a:ext cx="12193644" cy="6354732"/>
+            <a:off x="0" y="163513"/>
+            <a:ext cx="12192000" cy="6529387"/>
           </a:xfrm>
+          <a:prstGeom prst="rect">
+            <a:avLst/>
+          </a:prstGeom>
+          <a:noFill/>
+          <a:extLst>
+            <a:ext uri="{909E8E84-426E-40DD-AFC4-6F175D3DCCD1}">
+              <a14:hiddenFill xmlns:a14="http://schemas.microsoft.com/office/drawing/2010/main">
+                <a:solidFill>
+                  <a:srgbClr val="FFFFFF"/>
+                </a:solidFill>
+              </a14:hiddenFill>
+            </a:ext>
+          </a:extLst>
         </p:spPr>
       </p:pic>
-      <p:sp>
-        <p:nvSpPr>
-          <p:cNvPr id="4" name="Dian numeron paikkamerkki 3">
-            <a:extLst>
-              <a:ext uri="{FF2B5EF4-FFF2-40B4-BE49-F238E27FC236}">
-                <a16:creationId xmlns:a16="http://schemas.microsoft.com/office/drawing/2014/main" id="{0E62D80D-56EF-6199-C7B2-9EBA5BBF557C}"/>
-              </a:ext>
-            </a:extLst>
-          </p:cNvPr>
-          <p:cNvSpPr>
-            <a:spLocks noGrp="1"/>
-          </p:cNvSpPr>
-          <p:nvPr>
-            <p:ph type="sldNum" sz="quarter" idx="12"/>
-          </p:nvPr>
-        </p:nvSpPr>
-        <p:spPr/>
-        <p:txBody>
-          <a:bodyPr/>
-          <a:lstStyle/>
-          <a:p>
-            <a:fld id="{87E7843D-FF13-4365-9478-9625B70A2705}" type="slidenum">
-              <a:rPr lang="en-US" smtClean="0"/>
-              <a:t>6</a:t>
-            </a:fld>
-            <a:endParaRPr lang="en-US"/>
-          </a:p>
-        </p:txBody>
-      </p:sp>
     </p:spTree>
     <p:extLst>
       <p:ext uri="{BB962C8B-B14F-4D97-AF65-F5344CB8AC3E}">
@@ -5065,7 +5108,7 @@
                   <a:spcPts val="600"/>
                 </a:spcAft>
               </a:pPr>
-              <a:t>4</a:t>
+              <a:t>5</a:t>
             </a:fld>
             <a:endParaRPr lang="en-US"/>
           </a:p>
@@ -5385,7 +5428,7 @@
           <a:p>
             <a:fld id="{87E7843D-FF13-4365-9478-9625B70A2705}" type="slidenum">
               <a:rPr lang="en-US" smtClean="0"/>
-              <a:t>2</a:t>
+              <a:t>6</a:t>
             </a:fld>
             <a:endParaRPr lang="en-US"/>
           </a:p>
@@ -6415,6 +6458,15 @@
 </file>
 
 <file path=customXml/item1.xml><?xml version="1.0" encoding="utf-8"?>
+<?mso-contentType ?>
+<FormTemplates xmlns="http://schemas.microsoft.com/sharepoint/v3/contenttype/forms">
+  <Display>DocumentLibraryForm</Display>
+  <Edit>DocumentLibraryForm</Edit>
+  <New>DocumentLibraryForm</New>
+</FormTemplates>
+</file>
+
+<file path=customXml/item2.xml><?xml version="1.0" encoding="utf-8"?>
 <p:properties xmlns:p="http://schemas.microsoft.com/office/2006/metadata/properties" xmlns:xsi="http://www.w3.org/2001/XMLSchema-instance" xmlns:pc="http://schemas.microsoft.com/office/infopath/2007/PartnerControls">
   <documentManagement>
     <_ip_UnifiedCompliancePolicyUIAction xmlns="http://schemas.microsoft.com/sharepoint/v3" xsi:nil="true"/>
@@ -6431,15 +6483,6 @@
     <MediaServiceKeyPoints xmlns="71af3243-3dd4-4a8d-8c0d-dd76da1f02a5" xsi:nil="true"/>
   </documentManagement>
 </p:properties>
-</file>
-
-<file path=customXml/item2.xml><?xml version="1.0" encoding="utf-8"?>
-<?mso-contentType ?>
-<FormTemplates xmlns="http://schemas.microsoft.com/sharepoint/v3/contenttype/forms">
-  <Display>DocumentLibraryForm</Display>
-  <Edit>DocumentLibraryForm</Edit>
-  <New>DocumentLibraryForm</New>
-</FormTemplates>
 </file>
 
 <file path=customXml/item3.xml><?xml version="1.0" encoding="utf-8"?>
@@ -6719,6 +6762,14 @@
 </file>
 
 <file path=customXml/itemProps1.xml><?xml version="1.0" encoding="utf-8"?>
+<ds:datastoreItem xmlns:ds="http://schemas.openxmlformats.org/officeDocument/2006/customXml" ds:itemID="{350455F8-10A0-4EEF-9BB1-9035E295B165}">
+  <ds:schemaRefs>
+    <ds:schemaRef ds:uri="http://schemas.microsoft.com/sharepoint/v3/contenttype/forms"/>
+  </ds:schemaRefs>
+</ds:datastoreItem>
+</file>
+
+<file path=customXml/itemProps2.xml><?xml version="1.0" encoding="utf-8"?>
 <ds:datastoreItem xmlns:ds="http://schemas.openxmlformats.org/officeDocument/2006/customXml" ds:itemID="{79B0F2AC-8567-4D03-BFFC-653DB596C528}">
   <ds:schemaRefs>
     <ds:schemaRef ds:uri="230e9df3-be65-4c73-a93b-d1236ebd677e"/>
@@ -6726,14 +6777,6 @@
     <ds:schemaRef ds:uri="http://schemas.microsoft.com/office/2006/metadata/properties"/>
     <ds:schemaRef ds:uri="http://schemas.microsoft.com/office/infopath/2007/PartnerControls"/>
     <ds:schemaRef ds:uri="http://schemas.microsoft.com/sharepoint/v3"/>
-  </ds:schemaRefs>
-</ds:datastoreItem>
-</file>
-
-<file path=customXml/itemProps2.xml><?xml version="1.0" encoding="utf-8"?>
-<ds:datastoreItem xmlns:ds="http://schemas.openxmlformats.org/officeDocument/2006/customXml" ds:itemID="{350455F8-10A0-4EEF-9BB1-9035E295B165}">
-  <ds:schemaRefs>
-    <ds:schemaRef ds:uri="http://schemas.microsoft.com/sharepoint/v3/contenttype/forms"/>
   </ds:schemaRefs>
 </ds:datastoreItem>
 </file>

</xml_diff>